<commit_message>
quick update with inclass
</commit_message>
<xml_diff>
--- a/Slides/On-Campus/09_02_SystemOfProtocolsAndMoreLists.pptx
+++ b/Slides/On-Campus/09_02_SystemOfProtocolsAndMoreLists.pptx
@@ -224,7 +224,7 @@
           <a:p>
             <a:fld id="{4D7E51A5-B478-1E40-8CBB-0DAA8831E99D}" type="datetimeFigureOut">
               <a:rPr lang="en-US" smtClean="0"/>
-              <a:t>10/20/2021</a:t>
+              <a:t>10/21/21</a:t>
             </a:fld>
             <a:endParaRPr lang="en-US"/>
           </a:p>
@@ -389,7 +389,7 @@
           <a:p>
             <a:fld id="{D0ED587F-861E-6740-9643-E3DDAE89B8D6}" type="datetimeFigureOut">
               <a:rPr lang="en-US" smtClean="0"/>
-              <a:t>10/20/2021</a:t>
+              <a:t>10/21/21</a:t>
             </a:fld>
             <a:endParaRPr lang="en-US"/>
           </a:p>
@@ -685,7 +685,7 @@
         </p:nvSpPr>
         <p:spPr>
           <a:xfrm>
-            <a:off x="381300" y="685800"/>
+            <a:off x="381000" y="685800"/>
             <a:ext cx="6096000" cy="3429000"/>
           </a:xfrm>
           <a:custGeom>
@@ -7704,7 +7704,7 @@
               <a:rPr lang="en-US" dirty="0">
                 <a:latin typeface="Consolas" panose="020B0609020204030204" pitchFamily="49" charset="0"/>
               </a:rPr>
-              <a:t>[‘10’, ‘255’, ‘123’, ‘96]  # notice they are all String values</a:t>
+              <a:t>[‘10’, ‘255’, ‘123’, ’96’]  # notice they are all String values</a:t>
             </a:r>
           </a:p>
           <a:p>
@@ -7736,14 +7736,14 @@
             <a:pPr lvl="1"/>
             <a:r>
               <a:rPr lang="en-US" dirty="0"/>
-              <a:t>0 10</a:t>
+              <a:t>index:0 value:10</a:t>
             </a:r>
           </a:p>
           <a:p>
             <a:pPr lvl="1"/>
             <a:r>
               <a:rPr lang="en-US" dirty="0"/>
-              <a:t>1 255</a:t>
+              <a:t>index:1 value:255</a:t>
             </a:r>
           </a:p>
           <a:p>
@@ -9065,7 +9065,7 @@
           <a:p>
             <a:r>
               <a:rPr lang="en-US" dirty="0"/>
-              <a:t>What is your favorite thing to do online?</a:t>
+              <a:t>What website do you use the most?</a:t>
             </a:r>
           </a:p>
         </p:txBody>
@@ -9148,8 +9148,8 @@
         </p:nvSpPr>
         <p:spPr>
           <a:xfrm>
-            <a:off x="628094" y="2487905"/>
-            <a:ext cx="12561413" cy="4409120"/>
+            <a:off x="508000" y="2487905"/>
+            <a:ext cx="12681507" cy="4409120"/>
           </a:xfrm>
           <a:prstGeom prst="rect">
             <a:avLst/>

</xml_diff>